<commit_message>
Update Non-Comparison Based Sorting.pptx
</commit_message>
<xml_diff>
--- a/Non-Comparison Based Sorting.pptx
+++ b/Non-Comparison Based Sorting.pptx
@@ -3709,8 +3709,13 @@
           <a:p>
             <a:r>
               <a:rPr lang="en-US" dirty="0"/>
-              <a:t>Section: L3</a:t>
-            </a:r>
+              <a:t>Section</a:t>
+            </a:r>
+            <a:r>
+              <a:rPr lang="en-US"/>
+              <a:t>: L2</a:t>
+            </a:r>
+            <a:endParaRPr lang="en-US" dirty="0"/>
           </a:p>
           <a:p>
             <a:r>
@@ -6899,15 +6904,6 @@
 </file>
 
 <file path=customXml/item1.xml><?xml version="1.0" encoding="utf-8"?>
-<?mso-contentType ?>
-<FormTemplates xmlns="http://schemas.microsoft.com/sharepoint/v3/contenttype/forms">
-  <Display>DocumentLibraryForm</Display>
-  <Edit>DocumentLibraryForm</Edit>
-  <New>DocumentLibraryForm</New>
-</FormTemplates>
-</file>
-
-<file path=customXml/item2.xml><?xml version="1.0" encoding="utf-8"?>
 <ct:contentTypeSchema xmlns:ct="http://schemas.microsoft.com/office/2006/metadata/contentType" xmlns:ma="http://schemas.microsoft.com/office/2006/metadata/properties/metaAttributes" ct:_="" ma:_="" ma:contentTypeName="Document" ma:contentTypeID="0x0101001AD84AD7EE836A4482ECC2B633FF33C1" ma:contentTypeVersion="7" ma:contentTypeDescription="Create a new document." ma:contentTypeScope="" ma:versionID="df12801d37441794c084e3f1d749f85e">
   <xsd:schema xmlns:xsd="http://www.w3.org/2001/XMLSchema" xmlns:xs="http://www.w3.org/2001/XMLSchema" xmlns:p="http://schemas.microsoft.com/office/2006/metadata/properties" xmlns:ns3="01d80298-d156-4026-acca-19fead3c17c1" xmlns:ns4="42404f65-6640-4f1f-b3e2-e44a44563a99" targetNamespace="http://schemas.microsoft.com/office/2006/metadata/properties" ma:root="true" ma:fieldsID="415dec55e9846f5efb816b8926b6d945" ns3:_="" ns4:_="">
     <xsd:import namespace="01d80298-d156-4026-acca-19fead3c17c1"/>
@@ -7092,6 +7088,15 @@
 </ct:contentTypeSchema>
 </file>
 
+<file path=customXml/item2.xml><?xml version="1.0" encoding="utf-8"?>
+<?mso-contentType ?>
+<FormTemplates xmlns="http://schemas.microsoft.com/sharepoint/v3/contenttype/forms">
+  <Display>DocumentLibraryForm</Display>
+  <Edit>DocumentLibraryForm</Edit>
+  <New>DocumentLibraryForm</New>
+</FormTemplates>
+</file>
+
 <file path=customXml/item3.xml><?xml version="1.0" encoding="utf-8"?>
 <p:properties xmlns:p="http://schemas.microsoft.com/office/2006/metadata/properties" xmlns:xsi="http://www.w3.org/2001/XMLSchema-instance" xmlns:pc="http://schemas.microsoft.com/office/infopath/2007/PartnerControls">
   <documentManagement/>
@@ -7099,14 +7104,6 @@
 </file>
 
 <file path=customXml/itemProps1.xml><?xml version="1.0" encoding="utf-8"?>
-<ds:datastoreItem xmlns:ds="http://schemas.openxmlformats.org/officeDocument/2006/customXml" ds:itemID="{87E8D11C-E81F-42FE-BEE0-DE7502739775}">
-  <ds:schemaRefs>
-    <ds:schemaRef ds:uri="http://schemas.microsoft.com/sharepoint/v3/contenttype/forms"/>
-  </ds:schemaRefs>
-</ds:datastoreItem>
-</file>
-
-<file path=customXml/itemProps2.xml><?xml version="1.0" encoding="utf-8"?>
 <ds:datastoreItem xmlns:ds="http://schemas.openxmlformats.org/officeDocument/2006/customXml" ds:itemID="{DC32E71E-DA60-4B72-AEC7-43FC0111C9DF}">
   <ds:schemaRefs>
     <ds:schemaRef ds:uri="http://schemas.microsoft.com/office/2006/metadata/contentType"/>
@@ -7121,6 +7118,14 @@
     <ds:schemaRef ds:uri="http://purl.org/dc/elements/1.1/"/>
     <ds:schemaRef ds:uri="http://purl.org/dc/terms/"/>
     <ds:schemaRef ds:uri="http://schemas.microsoft.com/internal/obd"/>
+  </ds:schemaRefs>
+</ds:datastoreItem>
+</file>
+
+<file path=customXml/itemProps2.xml><?xml version="1.0" encoding="utf-8"?>
+<ds:datastoreItem xmlns:ds="http://schemas.openxmlformats.org/officeDocument/2006/customXml" ds:itemID="{87E8D11C-E81F-42FE-BEE0-DE7502739775}">
+  <ds:schemaRefs>
+    <ds:schemaRef ds:uri="http://schemas.microsoft.com/sharepoint/v3/contenttype/forms"/>
   </ds:schemaRefs>
 </ds:datastoreItem>
 </file>

</xml_diff>